<commit_message>
Add the comment for the functions.
</commit_message>
<xml_diff>
--- a/ESSLAB.pptx
+++ b/ESSLAB.pptx
@@ -282,7 +282,7 @@
           <a:p>
             <a:fld id="{F397A5DB-8F38-4CAC-AB71-5A51D18454D4}" type="datetimeFigureOut">
               <a:rPr lang="ko-KR" altLang="en-US" smtClean="0"/>
-              <a:t>2024-01-04</a:t>
+              <a:t>2024. 1. 5.</a:t>
             </a:fld>
             <a:endParaRPr lang="ko-KR" altLang="en-US"/>
           </a:p>
@@ -480,7 +480,7 @@
           <a:p>
             <a:fld id="{F397A5DB-8F38-4CAC-AB71-5A51D18454D4}" type="datetimeFigureOut">
               <a:rPr lang="ko-KR" altLang="en-US" smtClean="0"/>
-              <a:t>2024-01-04</a:t>
+              <a:t>2024. 1. 5.</a:t>
             </a:fld>
             <a:endParaRPr lang="ko-KR" altLang="en-US"/>
           </a:p>
@@ -688,7 +688,7 @@
           <a:p>
             <a:fld id="{F397A5DB-8F38-4CAC-AB71-5A51D18454D4}" type="datetimeFigureOut">
               <a:rPr lang="ko-KR" altLang="en-US" smtClean="0"/>
-              <a:t>2024-01-04</a:t>
+              <a:t>2024. 1. 5.</a:t>
             </a:fld>
             <a:endParaRPr lang="ko-KR" altLang="en-US"/>
           </a:p>
@@ -886,7 +886,7 @@
           <a:p>
             <a:fld id="{F397A5DB-8F38-4CAC-AB71-5A51D18454D4}" type="datetimeFigureOut">
               <a:rPr lang="ko-KR" altLang="en-US" smtClean="0"/>
-              <a:t>2024-01-04</a:t>
+              <a:t>2024. 1. 5.</a:t>
             </a:fld>
             <a:endParaRPr lang="ko-KR" altLang="en-US"/>
           </a:p>
@@ -1161,7 +1161,7 @@
           <a:p>
             <a:fld id="{F397A5DB-8F38-4CAC-AB71-5A51D18454D4}" type="datetimeFigureOut">
               <a:rPr lang="ko-KR" altLang="en-US" smtClean="0"/>
-              <a:t>2024-01-04</a:t>
+              <a:t>2024. 1. 5.</a:t>
             </a:fld>
             <a:endParaRPr lang="ko-KR" altLang="en-US"/>
           </a:p>
@@ -1426,7 +1426,7 @@
           <a:p>
             <a:fld id="{F397A5DB-8F38-4CAC-AB71-5A51D18454D4}" type="datetimeFigureOut">
               <a:rPr lang="ko-KR" altLang="en-US" smtClean="0"/>
-              <a:t>2024-01-04</a:t>
+              <a:t>2024. 1. 5.</a:t>
             </a:fld>
             <a:endParaRPr lang="ko-KR" altLang="en-US"/>
           </a:p>
@@ -1838,7 +1838,7 @@
           <a:p>
             <a:fld id="{F397A5DB-8F38-4CAC-AB71-5A51D18454D4}" type="datetimeFigureOut">
               <a:rPr lang="ko-KR" altLang="en-US" smtClean="0"/>
-              <a:t>2024-01-04</a:t>
+              <a:t>2024. 1. 5.</a:t>
             </a:fld>
             <a:endParaRPr lang="ko-KR" altLang="en-US"/>
           </a:p>
@@ -1979,7 +1979,7 @@
           <a:p>
             <a:fld id="{F397A5DB-8F38-4CAC-AB71-5A51D18454D4}" type="datetimeFigureOut">
               <a:rPr lang="ko-KR" altLang="en-US" smtClean="0"/>
-              <a:t>2024-01-04</a:t>
+              <a:t>2024. 1. 5.</a:t>
             </a:fld>
             <a:endParaRPr lang="ko-KR" altLang="en-US"/>
           </a:p>
@@ -2092,7 +2092,7 @@
           <a:p>
             <a:fld id="{F397A5DB-8F38-4CAC-AB71-5A51D18454D4}" type="datetimeFigureOut">
               <a:rPr lang="ko-KR" altLang="en-US" smtClean="0"/>
-              <a:t>2024-01-04</a:t>
+              <a:t>2024. 1. 5.</a:t>
             </a:fld>
             <a:endParaRPr lang="ko-KR" altLang="en-US"/>
           </a:p>
@@ -2403,7 +2403,7 @@
           <a:p>
             <a:fld id="{F397A5DB-8F38-4CAC-AB71-5A51D18454D4}" type="datetimeFigureOut">
               <a:rPr lang="ko-KR" altLang="en-US" smtClean="0"/>
-              <a:t>2024-01-04</a:t>
+              <a:t>2024. 1. 5.</a:t>
             </a:fld>
             <a:endParaRPr lang="ko-KR" altLang="en-US"/>
           </a:p>
@@ -2691,7 +2691,7 @@
           <a:p>
             <a:fld id="{F397A5DB-8F38-4CAC-AB71-5A51D18454D4}" type="datetimeFigureOut">
               <a:rPr lang="ko-KR" altLang="en-US" smtClean="0"/>
-              <a:t>2024-01-04</a:t>
+              <a:t>2024. 1. 5.</a:t>
             </a:fld>
             <a:endParaRPr lang="ko-KR" altLang="en-US"/>
           </a:p>
@@ -2932,7 +2932,7 @@
           <a:p>
             <a:fld id="{F397A5DB-8F38-4CAC-AB71-5A51D18454D4}" type="datetimeFigureOut">
               <a:rPr lang="ko-KR" altLang="en-US" smtClean="0"/>
-              <a:t>2024-01-04</a:t>
+              <a:t>2024. 1. 5.</a:t>
             </a:fld>
             <a:endParaRPr lang="ko-KR" altLang="en-US"/>
           </a:p>
@@ -3401,7 +3401,12 @@
             <p:ph type="subTitle" idx="1"/>
           </p:nvPr>
         </p:nvSpPr>
-        <p:spPr/>
+        <p:spPr>
+          <a:xfrm>
+            <a:off x="1524000" y="4121991"/>
+            <a:ext cx="9144000" cy="952033"/>
+          </a:xfrm>
+        </p:spPr>
         <p:txBody>
           <a:bodyPr/>
           <a:lstStyle/>

</xml_diff>